<commit_message>
Übungen und Folien Basisausbildung
</commit_message>
<xml_diff>
--- a/Folien - Trainerleitfaden/Einheit 11 JS TN.pptx
+++ b/Folien - Trainerleitfaden/Einheit 11 JS TN.pptx
@@ -314,7 +314,7 @@
               <a:rPr lang="de-AT" smtClean="0">
                 <a:latin typeface="Arial" panose="020B0604020202020204" pitchFamily="34" charset="0"/>
               </a:rPr>
-              <a:t>17.05.2021</a:t>
+              <a:t>18.05.2021</a:t>
             </a:fld>
             <a:endParaRPr lang="de-AT" dirty="0">
               <a:latin typeface="Arial" panose="020B0604020202020204" pitchFamily="34" charset="0"/>
@@ -1416,18 +1416,18 @@
           </a:bodyPr>
           <a:lstStyle>
             <a:lvl1pPr marL="228594" indent="-228594">
-              <a:buFont typeface="Font Awesome 5 Free Solid" panose="02000503000000000000" pitchFamily="50" charset="2"/>
-              <a:buChar char=""/>
+              <a:buFont typeface="Arial" panose="020B0604020202020204" pitchFamily="34" charset="0"/>
+              <a:buChar char="•"/>
               <a:defRPr/>
             </a:lvl1pPr>
             <a:lvl2pPr marL="685783" indent="-228594">
-              <a:buFont typeface="Font Awesome 5 Free Solid" panose="02000503000000000000" pitchFamily="50" charset="2"/>
-              <a:buChar char=""/>
+              <a:buFont typeface="Courier New" panose="02070309020205020404" pitchFamily="49" charset="0"/>
+              <a:buChar char="o"/>
               <a:defRPr/>
             </a:lvl2pPr>
             <a:lvl3pPr marL="1142971" indent="-228594">
-              <a:buFont typeface="Font Awesome 5 Free Solid" panose="02000503000000000000" pitchFamily="50" charset="2"/>
-              <a:buChar char=""/>
+              <a:buFont typeface="Wingdings" panose="05000000000000000000" pitchFamily="2" charset="2"/>
+              <a:buChar char="§"/>
               <a:defRPr/>
             </a:lvl3pPr>
           </a:lstStyle>
@@ -12024,12 +12024,20 @@
             </a:lvl9pPr>
           </a:lstStyle>
           <a:p>
+            <a:pPr>
+              <a:buFont typeface="Arial" panose="020B0604020202020204" pitchFamily="34" charset="0"/>
+              <a:buChar char="•"/>
+            </a:pPr>
             <a:r>
               <a:rPr lang="de-AT" dirty="0"/>
               <a:t>Häufiger im Einsatz</a:t>
             </a:r>
           </a:p>
           <a:p>
+            <a:pPr>
+              <a:buFont typeface="Arial" panose="020B0604020202020204" pitchFamily="34" charset="0"/>
+              <a:buChar char="•"/>
+            </a:pPr>
             <a:r>
               <a:rPr lang="de-AT" dirty="0"/>
               <a:t>Kann gleich befüllt werden</a:t>
@@ -12229,6 +12237,10 @@
             </a:lvl9pPr>
           </a:lstStyle>
           <a:p>
+            <a:pPr>
+              <a:buFont typeface="Arial" panose="020B0604020202020204" pitchFamily="34" charset="0"/>
+              <a:buChar char="•"/>
+            </a:pPr>
             <a:r>
               <a:rPr lang="de-AT" dirty="0"/>
               <a:t>Arrays sind in JS Objekte mit besonderen Eigenschaften</a:t>
@@ -12428,6 +12440,10 @@
             </a:lvl9pPr>
           </a:lstStyle>
           <a:p>
+            <a:pPr>
+              <a:buFont typeface="Arial" panose="020B0604020202020204" pitchFamily="34" charset="0"/>
+              <a:buChar char="•"/>
+            </a:pPr>
             <a:r>
               <a:rPr lang="de-AT" dirty="0"/>
               <a:t>Elemente müssen nicht den gleichen Datentyp aufweisen</a:t>
@@ -17105,24 +17121,40 @@
           <a:bodyPr/>
           <a:lstStyle/>
           <a:p>
+            <a:pPr>
+              <a:buFont typeface="Arial" panose="020B0604020202020204" pitchFamily="34" charset="0"/>
+              <a:buChar char="•"/>
+            </a:pPr>
             <a:r>
               <a:rPr lang="de-AT" dirty="0"/>
               <a:t>Einsatzzweck: dynamische Internetseiten erstellen</a:t>
             </a:r>
           </a:p>
           <a:p>
+            <a:pPr>
+              <a:buFont typeface="Arial" panose="020B0604020202020204" pitchFamily="34" charset="0"/>
+              <a:buChar char="•"/>
+            </a:pPr>
             <a:r>
               <a:rPr lang="de-AT" dirty="0"/>
               <a:t>Vielfältige Möglichkeiten um Aufbau, Layout und Inhalte zu verändern</a:t>
             </a:r>
           </a:p>
           <a:p>
+            <a:pPr>
+              <a:buFont typeface="Arial" panose="020B0604020202020204" pitchFamily="34" charset="0"/>
+              <a:buChar char="•"/>
+            </a:pPr>
             <a:r>
               <a:rPr lang="de-AT" dirty="0"/>
               <a:t>Zählt mittlerweile zu den etablierten Web-Technologien</a:t>
             </a:r>
           </a:p>
           <a:p>
+            <a:pPr>
+              <a:buFont typeface="Arial" panose="020B0604020202020204" pitchFamily="34" charset="0"/>
+              <a:buChar char="•"/>
+            </a:pPr>
             <a:r>
               <a:rPr lang="de-AT" dirty="0"/>
               <a:t>Aufgrund großer Beliebtheit hat sich Anwendungsbereich ausgeweitet</a:t>
@@ -17159,12 +17191,20 @@
             </a:r>
           </a:p>
           <a:p>
+            <a:pPr>
+              <a:buFont typeface="Arial" panose="020B0604020202020204" pitchFamily="34" charset="0"/>
+              <a:buChar char="•"/>
+            </a:pPr>
             <a:r>
               <a:rPr lang="de-AT" dirty="0"/>
               <a:t>Browser-Anwendungen bleiben mit großem Abstand der häufigste Einsatzbereich von JS</a:t>
             </a:r>
           </a:p>
           <a:p>
+            <a:pPr>
+              <a:buFont typeface="Arial" panose="020B0604020202020204" pitchFamily="34" charset="0"/>
+              <a:buChar char="•"/>
+            </a:pPr>
             <a:r>
               <a:rPr lang="de-AT" dirty="0"/>
               <a:t>Läuft innerhalb einer Sandbox, dadurch kein Zugriff auf Funktionen des Betriebssystems, Hardware oder zu Netzwerken möglich</a:t>
@@ -18890,12 +18930,20 @@
             </a:lvl9pPr>
           </a:lstStyle>
           <a:p>
+            <a:pPr>
+              <a:buFont typeface="Arial" panose="020B0604020202020204" pitchFamily="34" charset="0"/>
+              <a:buChar char="•"/>
+            </a:pPr>
             <a:r>
               <a:rPr lang="de-AT" dirty="0"/>
               <a:t>Auch möglich mehrere Werte zu übergeben = mehrere Werte in der Funktionsklammer</a:t>
             </a:r>
           </a:p>
           <a:p>
+            <a:pPr>
+              <a:buFont typeface="Arial" panose="020B0604020202020204" pitchFamily="34" charset="0"/>
+              <a:buChar char="•"/>
+            </a:pPr>
             <a:r>
               <a:rPr lang="de-AT" dirty="0"/>
               <a:t>Funktion nimmt Übergabewert in einer Variable auf, deren Namen bereits im Hauptprogramm existiert. Funktion erstellt eine neue Variable mit lokalem Gültigkeitsbereich. Wenn deren Wert verändert wird, wirkt sich das nicht auf die gleichlautende Variable im Hauptprogramm aus</a:t>
@@ -20480,12 +20528,20 @@
           <a:bodyPr/>
           <a:lstStyle/>
           <a:p>
+            <a:pPr>
+              <a:buFont typeface="Arial" panose="020B0604020202020204" pitchFamily="34" charset="0"/>
+              <a:buChar char="•"/>
+            </a:pPr>
             <a:r>
               <a:rPr lang="de-AT" dirty="0"/>
               <a:t>Entstehung eng mit Entwicklung der Webbrowser verbunden</a:t>
             </a:r>
           </a:p>
           <a:p>
+            <a:pPr>
+              <a:buFont typeface="Arial" panose="020B0604020202020204" pitchFamily="34" charset="0"/>
+              <a:buChar char="•"/>
+            </a:pPr>
             <a:r>
               <a:rPr lang="de-AT" dirty="0"/>
               <a:t>Erste Version erschien 1995 unter der Bezeichnung „</a:t>
@@ -20500,6 +20556,10 @@
             </a:r>
           </a:p>
           <a:p>
+            <a:pPr>
+              <a:buFont typeface="Arial" panose="020B0604020202020204" pitchFamily="34" charset="0"/>
+              <a:buChar char="•"/>
+            </a:pPr>
             <a:r>
               <a:rPr lang="de-AT" dirty="0"/>
               <a:t>Wenige Monate nach Ersterscheinung umbenannt in JavaScript (Marketingstrategie)</a:t>
@@ -20591,6 +20651,10 @@
           <a:bodyPr/>
           <a:lstStyle/>
           <a:p>
+            <a:pPr>
+              <a:buFont typeface="Arial" panose="020B0604020202020204" pitchFamily="34" charset="0"/>
+              <a:buChar char="•"/>
+            </a:pPr>
             <a:r>
               <a:rPr lang="de-AT" dirty="0"/>
               <a:t>Früher musste innerhalb des </a:t>
@@ -20655,6 +20719,10 @@
             </a:r>
           </a:p>
           <a:p>
+            <a:pPr>
+              <a:buFont typeface="Arial" panose="020B0604020202020204" pitchFamily="34" charset="0"/>
+              <a:buChar char="•"/>
+            </a:pPr>
             <a:r>
               <a:rPr lang="de-AT" dirty="0">
                 <a:latin typeface="Consolas" panose="020B0609020204030204" pitchFamily="49" charset="0"/>
@@ -20667,6 +20735,10 @@
             </a:r>
           </a:p>
           <a:p>
+            <a:pPr>
+              <a:buFont typeface="Arial" panose="020B0604020202020204" pitchFamily="34" charset="0"/>
+              <a:buChar char="•"/>
+            </a:pPr>
             <a:r>
               <a:rPr lang="de-AT" dirty="0"/>
               <a:t>Semikolon beendet JS Befehle</a:t>
@@ -21398,6 +21470,10 @@
           <a:bodyPr/>
           <a:lstStyle/>
           <a:p>
+            <a:pPr>
+              <a:buFont typeface="Arial" panose="020B0604020202020204" pitchFamily="34" charset="0"/>
+              <a:buChar char="•"/>
+            </a:pPr>
             <a:r>
               <a:rPr lang="de-AT" dirty="0"/>
               <a:t>HTML Datei</a:t>
@@ -22360,6 +22436,10 @@
             </a:lvl9pPr>
           </a:lstStyle>
           <a:p>
+            <a:pPr>
+              <a:buFont typeface="Arial" panose="020B0604020202020204" pitchFamily="34" charset="0"/>
+              <a:buChar char="•"/>
+            </a:pPr>
             <a:r>
               <a:rPr lang="de-AT" dirty="0"/>
               <a:t>JS Datei</a:t>
@@ -22467,6 +22547,10 @@
           <a:bodyPr/>
           <a:lstStyle/>
           <a:p>
+            <a:pPr>
+              <a:buFont typeface="Arial" panose="020B0604020202020204" pitchFamily="34" charset="0"/>
+              <a:buChar char="•"/>
+            </a:pPr>
             <a:r>
               <a:rPr lang="de-AT" dirty="0"/>
               <a:t>Fehler und schlecht implementierte Funktionen wurden nicht verbessert</a:t>
@@ -22480,12 +22564,20 @@
             </a:r>
           </a:p>
           <a:p>
+            <a:pPr>
+              <a:buFont typeface="Arial" panose="020B0604020202020204" pitchFamily="34" charset="0"/>
+              <a:buChar char="•"/>
+            </a:pPr>
             <a:r>
               <a:rPr lang="de-AT" dirty="0"/>
               <a:t>2009 neue JavaScript-Version die alle bekannten Schwachstellen entfernen sollte =&gt; ECMA SCRIPT 5 (ES5) wurde veröffentlicht =&gt; nicht mehr abwärtskompatibel</a:t>
             </a:r>
           </a:p>
           <a:p>
+            <a:pPr>
+              <a:buFont typeface="Arial" panose="020B0604020202020204" pitchFamily="34" charset="0"/>
+              <a:buChar char="•"/>
+            </a:pPr>
             <a:r>
               <a:rPr lang="de-AT" dirty="0"/>
               <a:t>Mit </a:t>
@@ -22541,18 +22633,30 @@
             </a:r>
           </a:p>
           <a:p>
+            <a:pPr>
+              <a:buFont typeface="Arial" panose="020B0604020202020204" pitchFamily="34" charset="0"/>
+              <a:buChar char="•"/>
+            </a:pPr>
             <a:r>
               <a:rPr lang="de-AT" dirty="0"/>
               <a:t>Befehl muss stets am Anfang eingefügt werden</a:t>
             </a:r>
           </a:p>
           <a:p>
+            <a:pPr>
+              <a:buFont typeface="Arial" panose="020B0604020202020204" pitchFamily="34" charset="0"/>
+              <a:buChar char="•"/>
+            </a:pPr>
             <a:r>
               <a:rPr lang="de-AT" dirty="0"/>
               <a:t>Befehl kann nicht rückgängig gemacht werden</a:t>
             </a:r>
           </a:p>
           <a:p>
+            <a:pPr>
+              <a:buFont typeface="Arial" panose="020B0604020202020204" pitchFamily="34" charset="0"/>
+              <a:buChar char="•"/>
+            </a:pPr>
             <a:r>
               <a:rPr lang="de-AT" dirty="0"/>
               <a:t>Empfehlenswert neue Programme in dieser moderneren Version zu verfassen</a:t>
@@ -22840,6 +22944,10 @@
           <a:bodyPr/>
           <a:lstStyle/>
           <a:p>
+            <a:pPr>
+              <a:buFont typeface="Arial" panose="020B0604020202020204" pitchFamily="34" charset="0"/>
+              <a:buChar char="•"/>
+            </a:pPr>
             <a:r>
               <a:rPr lang="de-AT" dirty="0"/>
               <a:t>Einfache Möglichkeit für Interaktion mit Nutzer ist der </a:t>
@@ -22856,6 +22964,10 @@
             </a:r>
           </a:p>
           <a:p>
+            <a:pPr>
+              <a:buFont typeface="Arial" panose="020B0604020202020204" pitchFamily="34" charset="0"/>
+              <a:buChar char="•"/>
+            </a:pPr>
             <a:r>
               <a:rPr lang="de-AT" dirty="0"/>
               <a:t>Erzeugt ein neues Fenster, ähnlich dem </a:t>
@@ -23637,6 +23749,10 @@
             </a:lvl9pPr>
           </a:lstStyle>
           <a:p>
+            <a:pPr>
+              <a:buFont typeface="Arial" panose="020B0604020202020204" pitchFamily="34" charset="0"/>
+              <a:buChar char="•"/>
+            </a:pPr>
             <a:r>
               <a:rPr lang="de-AT" dirty="0"/>
               <a:t>der </a:t>

</xml_diff>